<commit_message>
Write an algorithm to handle mutiple npy files
Signed-off-by: Albert <wensinlor@gmail.com>
</commit_message>
<xml_diff>
--- a/Meeting_Materials/Ergonomics Semester 2 Week 1.pptx
+++ b/Meeting_Materials/Ergonomics Semester 2 Week 1.pptx
@@ -210,7 +210,7 @@
           <a:p>
             <a:fld id="{22B1E1AC-897E-4258-89CC-349F958F3456}" type="datetimeFigureOut">
               <a:rPr lang="en-US" smtClean="0"/>
-              <a:t>1/12/2023</a:t>
+              <a:t>1/17/2023</a:t>
             </a:fld>
             <a:endParaRPr lang="en-US"/>
           </a:p>
@@ -584,7 +584,7 @@
           <a:p>
             <a:fld id="{032246CF-3E64-44D5-82D2-E6C647CC0300}" type="datetime1">
               <a:rPr lang="en-US" smtClean="0"/>
-              <a:t>1/12/2023</a:t>
+              <a:t>1/17/2023</a:t>
             </a:fld>
             <a:endParaRPr lang="en-US"/>
           </a:p>
@@ -1112,7 +1112,7 @@
           <a:p>
             <a:fld id="{3753495E-55A6-46D8-A35E-192AB95FCC1E}" type="datetime1">
               <a:rPr lang="en-US" smtClean="0"/>
-              <a:t>1/12/2023</a:t>
+              <a:t>1/17/2023</a:t>
             </a:fld>
             <a:endParaRPr lang="en-US"/>
           </a:p>
@@ -1462,7 +1462,7 @@
           <a:p>
             <a:fld id="{7565C209-6024-4AE8-994C-64E567FE647E}" type="datetime1">
               <a:rPr lang="en-US" smtClean="0"/>
-              <a:t>1/12/2023</a:t>
+              <a:t>1/17/2023</a:t>
             </a:fld>
             <a:endParaRPr lang="en-US"/>
           </a:p>
@@ -3607,6 +3607,36 @@
           </a:p>
         </p:txBody>
       </p:sp>
+      <p:pic>
+        <p:nvPicPr>
+          <p:cNvPr id="3" name="Picture 2">
+            <a:extLst>
+              <a:ext uri="{FF2B5EF4-FFF2-40B4-BE49-F238E27FC236}">
+                <a16:creationId xmlns:a16="http://schemas.microsoft.com/office/drawing/2014/main" id="{EE16DE03-9CEC-1B09-DE9B-DE3024D49C32}"/>
+              </a:ext>
+            </a:extLst>
+          </p:cNvPr>
+          <p:cNvPicPr>
+            <a:picLocks noChangeAspect="1"/>
+          </p:cNvPicPr>
+          <p:nvPr/>
+        </p:nvPicPr>
+        <p:blipFill>
+          <a:blip r:embed="rId3"/>
+          <a:stretch>
+            <a:fillRect/>
+          </a:stretch>
+        </p:blipFill>
+        <p:spPr>
+          <a:xfrm>
+            <a:off x="5722224" y="2546112"/>
+            <a:ext cx="4564776" cy="2568163"/>
+          </a:xfrm>
+          <a:prstGeom prst="rect">
+            <a:avLst/>
+          </a:prstGeom>
+        </p:spPr>
+      </p:pic>
     </p:spTree>
     <p:extLst>
       <p:ext uri="{BB962C8B-B14F-4D97-AF65-F5344CB8AC3E}">
@@ -5452,20 +5482,20 @@
 </file>
 
 <file path=customXml/item2.xml><?xml version="1.0" encoding="utf-8"?>
+<p:properties xmlns:p="http://schemas.microsoft.com/office/2006/metadata/properties" xmlns:xsi="http://www.w3.org/2001/XMLSchema-instance" xmlns:pc="http://schemas.microsoft.com/office/infopath/2007/PartnerControls">
+  <documentManagement>
+    <_activity xmlns="5ba216d5-a24b-4c7d-b581-f7a53554ea73" xsi:nil="true"/>
+  </documentManagement>
+</p:properties>
+</file>
+
+<file path=customXml/item3.xml><?xml version="1.0" encoding="utf-8"?>
 <?mso-contentType ?>
 <FormTemplates xmlns="http://schemas.microsoft.com/sharepoint/v3/contenttype/forms">
   <Display>DocumentLibraryForm</Display>
   <Edit>DocumentLibraryForm</Edit>
   <New>DocumentLibraryForm</New>
 </FormTemplates>
-</file>
-
-<file path=customXml/item3.xml><?xml version="1.0" encoding="utf-8"?>
-<p:properties xmlns:p="http://schemas.microsoft.com/office/2006/metadata/properties" xmlns:xsi="http://www.w3.org/2001/XMLSchema-instance" xmlns:pc="http://schemas.microsoft.com/office/infopath/2007/PartnerControls">
-  <documentManagement>
-    <_activity xmlns="5ba216d5-a24b-4c7d-b581-f7a53554ea73" xsi:nil="true"/>
-  </documentManagement>
-</p:properties>
 </file>
 
 <file path=customXml/itemProps1.xml><?xml version="1.0" encoding="utf-8"?>
@@ -5488,14 +5518,6 @@
 </file>
 
 <file path=customXml/itemProps2.xml><?xml version="1.0" encoding="utf-8"?>
-<ds:datastoreItem xmlns:ds="http://schemas.openxmlformats.org/officeDocument/2006/customXml" ds:itemID="{1C6DAB36-EFD9-4CF1-AA80-50685C862F5B}">
-  <ds:schemaRefs>
-    <ds:schemaRef ds:uri="http://schemas.microsoft.com/sharepoint/v3/contenttype/forms"/>
-  </ds:schemaRefs>
-</ds:datastoreItem>
-</file>
-
-<file path=customXml/itemProps3.xml><?xml version="1.0" encoding="utf-8"?>
 <ds:datastoreItem xmlns:ds="http://schemas.openxmlformats.org/officeDocument/2006/customXml" ds:itemID="{D8F1D613-A81C-4781-B3C9-01F66B02D821}">
   <ds:schemaRefs>
     <ds:schemaRef ds:uri="http://www.w3.org/XML/1998/namespace"/>
@@ -5510,4 +5532,12 @@
     <ds:schemaRef ds:uri="http://purl.org/dc/dcmitype/"/>
   </ds:schemaRefs>
 </ds:datastoreItem>
+</file>
+
+<file path=customXml/itemProps3.xml><?xml version="1.0" encoding="utf-8"?>
+<ds:datastoreItem xmlns:ds="http://schemas.openxmlformats.org/officeDocument/2006/customXml" ds:itemID="{1C6DAB36-EFD9-4CF1-AA80-50685C862F5B}">
+  <ds:schemaRefs>
+    <ds:schemaRef ds:uri="http://schemas.microsoft.com/sharepoint/v3/contenttype/forms"/>
+  </ds:schemaRefs>
+</ds:datastoreItem>
 </file>
</xml_diff>